<commit_message>
Update Application Controller Pattern/Application Controller pattern.pptx
</commit_message>
<xml_diff>
--- a/Application Controller Pattern/Application Controller pattern.pptx
+++ b/Application Controller Pattern/Application Controller pattern.pptx
@@ -9,9 +9,8 @@
     <p:sldId id="257" r:id="rId3"/>
     <p:sldId id="258" r:id="rId4"/>
     <p:sldId id="260" r:id="rId5"/>
-    <p:sldId id="262" r:id="rId6"/>
-    <p:sldId id="261" r:id="rId7"/>
-    <p:sldId id="259" r:id="rId8"/>
+    <p:sldId id="261" r:id="rId6"/>
+    <p:sldId id="259" r:id="rId7"/>
   </p:sldIdLst>
   <p:sldSz cx="12192000" cy="6858000"/>
   <p:notesSz cx="6858000" cy="9144000"/>
@@ -110,6 +109,11 @@
       </a:defRPr>
     </a:lvl9pPr>
   </p:defaultTextStyle>
+  <p:extLst>
+    <p:ext uri="{EFAFB233-063F-42B5-8137-9DF3F51BA10A}">
+      <p15:sldGuideLst xmlns:p15="http://schemas.microsoft.com/office/powerpoint/2012/main"/>
+    </p:ext>
+  </p:extLst>
 </p:presentation>
 </file>
 
@@ -330,7 +334,7 @@
           <a:p>
             <a:fld id="{B18D79D4-D837-2D46-9131-C8B01A604163}" type="datetimeFigureOut">
               <a:rPr lang="en-US" smtClean="0"/>
-              <a:t>10/19/18</a:t>
+              <a:t>10/22/18</a:t>
             </a:fld>
             <a:endParaRPr lang="en-US"/>
           </a:p>
@@ -665,7 +669,7 @@
           <a:p>
             <a:fld id="{B18D79D4-D837-2D46-9131-C8B01A604163}" type="datetimeFigureOut">
               <a:rPr lang="en-US" smtClean="0"/>
-              <a:t>10/19/18</a:t>
+              <a:t>10/22/18</a:t>
             </a:fld>
             <a:endParaRPr lang="en-US"/>
           </a:p>
@@ -968,7 +972,7 @@
           <a:p>
             <a:fld id="{B18D79D4-D837-2D46-9131-C8B01A604163}" type="datetimeFigureOut">
               <a:rPr lang="en-US" smtClean="0"/>
-              <a:t>10/19/18</a:t>
+              <a:t>10/22/18</a:t>
             </a:fld>
             <a:endParaRPr lang="en-US"/>
           </a:p>
@@ -1216,7 +1220,7 @@
           <a:p>
             <a:fld id="{B18D79D4-D837-2D46-9131-C8B01A604163}" type="datetimeFigureOut">
               <a:rPr lang="en-US" smtClean="0"/>
-              <a:t>10/19/18</a:t>
+              <a:t>10/22/18</a:t>
             </a:fld>
             <a:endParaRPr lang="en-US"/>
           </a:p>
@@ -1624,7 +1628,7 @@
           <a:p>
             <a:fld id="{B18D79D4-D837-2D46-9131-C8B01A604163}" type="datetimeFigureOut">
               <a:rPr lang="en-US" smtClean="0"/>
-              <a:t>10/19/18</a:t>
+              <a:t>10/22/18</a:t>
             </a:fld>
             <a:endParaRPr lang="en-US"/>
           </a:p>
@@ -1939,7 +1943,7 @@
           <a:p>
             <a:fld id="{B18D79D4-D837-2D46-9131-C8B01A604163}" type="datetimeFigureOut">
               <a:rPr lang="en-US" smtClean="0"/>
-              <a:t>10/19/18</a:t>
+              <a:t>10/22/18</a:t>
             </a:fld>
             <a:endParaRPr lang="en-US"/>
           </a:p>
@@ -2484,7 +2488,7 @@
           <a:p>
             <a:fld id="{B18D79D4-D837-2D46-9131-C8B01A604163}" type="datetimeFigureOut">
               <a:rPr lang="en-US" smtClean="0"/>
-              <a:t>10/19/18</a:t>
+              <a:t>10/22/18</a:t>
             </a:fld>
             <a:endParaRPr lang="en-US"/>
           </a:p>
@@ -2680,7 +2684,7 @@
           <a:p>
             <a:fld id="{B18D79D4-D837-2D46-9131-C8B01A604163}" type="datetimeFigureOut">
               <a:rPr lang="en-US" smtClean="0"/>
-              <a:t>10/19/18</a:t>
+              <a:t>10/22/18</a:t>
             </a:fld>
             <a:endParaRPr lang="en-US"/>
           </a:p>
@@ -2894,7 +2898,7 @@
           <a:p>
             <a:fld id="{B18D79D4-D837-2D46-9131-C8B01A604163}" type="datetimeFigureOut">
               <a:rPr lang="en-US" smtClean="0"/>
-              <a:t>10/19/18</a:t>
+              <a:t>10/22/18</a:t>
             </a:fld>
             <a:endParaRPr lang="en-US"/>
           </a:p>
@@ -3264,7 +3268,7 @@
           <a:p>
             <a:fld id="{B18D79D4-D837-2D46-9131-C8B01A604163}" type="datetimeFigureOut">
               <a:rPr lang="en-US" smtClean="0"/>
-              <a:t>10/19/18</a:t>
+              <a:t>10/22/18</a:t>
             </a:fld>
             <a:endParaRPr lang="en-US"/>
           </a:p>
@@ -3668,7 +3672,7 @@
           <a:p>
             <a:fld id="{B18D79D4-D837-2D46-9131-C8B01A604163}" type="datetimeFigureOut">
               <a:rPr lang="en-US" smtClean="0"/>
-              <a:t>10/19/18</a:t>
+              <a:t>10/22/18</a:t>
             </a:fld>
             <a:endParaRPr lang="en-US"/>
           </a:p>
@@ -4007,7 +4011,7 @@
           <a:p>
             <a:fld id="{B18D79D4-D837-2D46-9131-C8B01A604163}" type="datetimeFigureOut">
               <a:rPr lang="en-US" smtClean="0"/>
-              <a:t>10/19/18</a:t>
+              <a:t>10/22/18</a:t>
             </a:fld>
             <a:endParaRPr lang="en-US"/>
           </a:p>
@@ -4847,21 +4851,21 @@
         <p:spPr/>
         <p:txBody>
           <a:bodyPr>
-            <a:normAutofit fontScale="85000" lnSpcReduction="10000"/>
+            <a:normAutofit fontScale="92500" lnSpcReduction="20000"/>
           </a:bodyPr>
           <a:lstStyle/>
           <a:p>
             <a:r>
               <a:rPr lang="en-US" dirty="0"/>
-              <a:t>What does this mean? I think it means that you want </a:t>
-            </a:r>
-            <a:r>
-              <a:rPr lang="en-US" dirty="0" err="1"/>
-              <a:t>ro</a:t>
+              <a:t>What does this mean? I think it means that you </a:t>
+            </a:r>
+            <a:r>
+              <a:rPr lang="en-US"/>
+              <a:t>can reuse action </a:t>
             </a:r>
             <a:r>
               <a:rPr lang="en-US" dirty="0"/>
-              <a:t> reuses action and management view code without having to duplicate your code. </a:t>
+              <a:t>and management view code without having to duplicate your code. </a:t>
             </a:r>
           </a:p>
           <a:p>
@@ -4931,89 +4935,6 @@
       </p:grpSpPr>
       <p:sp>
         <p:nvSpPr>
-          <p:cNvPr id="2" name="Title 1">
-            <a:extLst>
-              <a:ext uri="{FF2B5EF4-FFF2-40B4-BE49-F238E27FC236}">
-                <a16:creationId xmlns:a16="http://schemas.microsoft.com/office/drawing/2014/main" id="{F31FD7B7-4FA2-5A45-B648-F533B559E34C}"/>
-              </a:ext>
-            </a:extLst>
-          </p:cNvPr>
-          <p:cNvSpPr>
-            <a:spLocks noGrp="1"/>
-          </p:cNvSpPr>
-          <p:nvPr>
-            <p:ph type="title"/>
-          </p:nvPr>
-        </p:nvSpPr>
-        <p:spPr/>
-        <p:txBody>
-          <a:bodyPr/>
-          <a:lstStyle/>
-          <a:p>
-            <a:r>
-              <a:rPr lang="en-US" dirty="0"/>
-              <a:t>Context, View, and Controller</a:t>
-            </a:r>
-          </a:p>
-        </p:txBody>
-      </p:sp>
-      <p:sp>
-        <p:nvSpPr>
-          <p:cNvPr id="3" name="Content Placeholder 2">
-            <a:extLst>
-              <a:ext uri="{FF2B5EF4-FFF2-40B4-BE49-F238E27FC236}">
-                <a16:creationId xmlns:a16="http://schemas.microsoft.com/office/drawing/2014/main" id="{65A77360-6AA7-FC4F-850D-0CBD486A4034}"/>
-              </a:ext>
-            </a:extLst>
-          </p:cNvPr>
-          <p:cNvSpPr>
-            <a:spLocks noGrp="1"/>
-          </p:cNvSpPr>
-          <p:nvPr>
-            <p:ph idx="1"/>
-          </p:nvPr>
-        </p:nvSpPr>
-        <p:spPr/>
-        <p:txBody>
-          <a:bodyPr/>
-          <a:lstStyle/>
-          <a:p>
-            <a:endParaRPr lang="en-US" dirty="0"/>
-          </a:p>
-        </p:txBody>
-      </p:sp>
-    </p:spTree>
-    <p:extLst>
-      <p:ext uri="{BB962C8B-B14F-4D97-AF65-F5344CB8AC3E}">
-        <p14:creationId xmlns:p14="http://schemas.microsoft.com/office/powerpoint/2010/main" val="3722396749"/>
-      </p:ext>
-    </p:extLst>
-  </p:cSld>
-  <p:clrMapOvr>
-    <a:masterClrMapping/>
-  </p:clrMapOvr>
-</p:sld>
-</file>
-
-<file path=ppt/slides/slide6.xml><?xml version="1.0" encoding="utf-8"?>
-<p:sld xmlns:a="http://schemas.openxmlformats.org/drawingml/2006/main" xmlns:r="http://schemas.openxmlformats.org/officeDocument/2006/relationships" xmlns:p="http://schemas.openxmlformats.org/presentationml/2006/main">
-  <p:cSld>
-    <p:spTree>
-      <p:nvGrpSpPr>
-        <p:cNvPr id="1" name=""/>
-        <p:cNvGrpSpPr/>
-        <p:nvPr/>
-      </p:nvGrpSpPr>
-      <p:grpSpPr>
-        <a:xfrm>
-          <a:off x="0" y="0"/>
-          <a:ext cx="0" cy="0"/>
-          <a:chOff x="0" y="0"/>
-          <a:chExt cx="0" cy="0"/>
-        </a:xfrm>
-      </p:grpSpPr>
-      <p:sp>
-        <p:nvSpPr>
           <p:cNvPr id="18" name="Text Placeholder 17">
             <a:extLst>
               <a:ext uri="{FF2B5EF4-FFF2-40B4-BE49-F238E27FC236}">
@@ -5162,7 +5083,7 @@
 </p:sld>
 </file>
 
-<file path=ppt/slides/slide7.xml><?xml version="1.0" encoding="utf-8"?>
+<file path=ppt/slides/slide6.xml><?xml version="1.0" encoding="utf-8"?>
 <p:sld xmlns:a="http://schemas.openxmlformats.org/drawingml/2006/main" xmlns:r="http://schemas.openxmlformats.org/officeDocument/2006/relationships" xmlns:p="http://schemas.openxmlformats.org/presentationml/2006/main">
   <p:cSld>
     <p:spTree>

</xml_diff>